<commit_message>
Only requires the algorithm for irregular polygon
</commit_message>
<xml_diff>
--- a/journalWallFriction/pictures/pdf/deltadist.pptx
+++ b/journalWallFriction/pictures/pdf/deltadist.pptx
@@ -243,7 +243,7 @@
           <a:p>
             <a:fld id="{407377E9-B467-4349-A636-4ADCC9286FD9}" type="datetimeFigureOut">
               <a:rPr lang="en-US" smtClean="0"/>
-              <a:t>5/13/18</a:t>
+              <a:t>5/22/18</a:t>
             </a:fld>
             <a:endParaRPr lang="en-US"/>
           </a:p>
@@ -413,7 +413,7 @@
           <a:p>
             <a:fld id="{407377E9-B467-4349-A636-4ADCC9286FD9}" type="datetimeFigureOut">
               <a:rPr lang="en-US" smtClean="0"/>
-              <a:t>5/13/18</a:t>
+              <a:t>5/22/18</a:t>
             </a:fld>
             <a:endParaRPr lang="en-US"/>
           </a:p>
@@ -593,7 +593,7 @@
           <a:p>
             <a:fld id="{407377E9-B467-4349-A636-4ADCC9286FD9}" type="datetimeFigureOut">
               <a:rPr lang="en-US" smtClean="0"/>
-              <a:t>5/13/18</a:t>
+              <a:t>5/22/18</a:t>
             </a:fld>
             <a:endParaRPr lang="en-US"/>
           </a:p>
@@ -763,7 +763,7 @@
           <a:p>
             <a:fld id="{407377E9-B467-4349-A636-4ADCC9286FD9}" type="datetimeFigureOut">
               <a:rPr lang="en-US" smtClean="0"/>
-              <a:t>5/13/18</a:t>
+              <a:t>5/22/18</a:t>
             </a:fld>
             <a:endParaRPr lang="en-US"/>
           </a:p>
@@ -1009,7 +1009,7 @@
           <a:p>
             <a:fld id="{407377E9-B467-4349-A636-4ADCC9286FD9}" type="datetimeFigureOut">
               <a:rPr lang="en-US" smtClean="0"/>
-              <a:t>5/13/18</a:t>
+              <a:t>5/22/18</a:t>
             </a:fld>
             <a:endParaRPr lang="en-US"/>
           </a:p>
@@ -1241,7 +1241,7 @@
           <a:p>
             <a:fld id="{407377E9-B467-4349-A636-4ADCC9286FD9}" type="datetimeFigureOut">
               <a:rPr lang="en-US" smtClean="0"/>
-              <a:t>5/13/18</a:t>
+              <a:t>5/22/18</a:t>
             </a:fld>
             <a:endParaRPr lang="en-US"/>
           </a:p>
@@ -1608,7 +1608,7 @@
           <a:p>
             <a:fld id="{407377E9-B467-4349-A636-4ADCC9286FD9}" type="datetimeFigureOut">
               <a:rPr lang="en-US" smtClean="0"/>
-              <a:t>5/13/18</a:t>
+              <a:t>5/22/18</a:t>
             </a:fld>
             <a:endParaRPr lang="en-US"/>
           </a:p>
@@ -1726,7 +1726,7 @@
           <a:p>
             <a:fld id="{407377E9-B467-4349-A636-4ADCC9286FD9}" type="datetimeFigureOut">
               <a:rPr lang="en-US" smtClean="0"/>
-              <a:t>5/13/18</a:t>
+              <a:t>5/22/18</a:t>
             </a:fld>
             <a:endParaRPr lang="en-US"/>
           </a:p>
@@ -1821,7 +1821,7 @@
           <a:p>
             <a:fld id="{407377E9-B467-4349-A636-4ADCC9286FD9}" type="datetimeFigureOut">
               <a:rPr lang="en-US" smtClean="0"/>
-              <a:t>5/13/18</a:t>
+              <a:t>5/22/18</a:t>
             </a:fld>
             <a:endParaRPr lang="en-US"/>
           </a:p>
@@ -2098,7 +2098,7 @@
           <a:p>
             <a:fld id="{407377E9-B467-4349-A636-4ADCC9286FD9}" type="datetimeFigureOut">
               <a:rPr lang="en-US" smtClean="0"/>
-              <a:t>5/13/18</a:t>
+              <a:t>5/22/18</a:t>
             </a:fld>
             <a:endParaRPr lang="en-US"/>
           </a:p>
@@ -2355,7 +2355,7 @@
           <a:p>
             <a:fld id="{407377E9-B467-4349-A636-4ADCC9286FD9}" type="datetimeFigureOut">
               <a:rPr lang="en-US" smtClean="0"/>
-              <a:t>5/13/18</a:t>
+              <a:t>5/22/18</a:t>
             </a:fld>
             <a:endParaRPr lang="en-US"/>
           </a:p>
@@ -2568,7 +2568,7 @@
           <a:p>
             <a:fld id="{407377E9-B467-4349-A636-4ADCC9286FD9}" type="datetimeFigureOut">
               <a:rPr lang="en-US" smtClean="0"/>
-              <a:t>5/13/18</a:t>
+              <a:t>5/22/18</a:t>
             </a:fld>
             <a:endParaRPr lang="en-US"/>
           </a:p>
@@ -2975,6 +2975,35 @@
       </p:grpSpPr>
       <p:pic>
         <p:nvPicPr>
+          <p:cNvPr id="3" name="Picture 2">
+            <a:extLst>
+              <a:ext uri="{FF2B5EF4-FFF2-40B4-BE49-F238E27FC236}">
+                <a16:creationId xmlns:a16="http://schemas.microsoft.com/office/drawing/2014/main" id="{E6AD829B-819B-524C-A58D-90F58AD8C1F2}"/>
+              </a:ext>
+            </a:extLst>
+          </p:cNvPr>
+          <p:cNvPicPr>
+            <a:picLocks noChangeAspect="1"/>
+          </p:cNvPicPr>
+          <p:nvPr/>
+        </p:nvPicPr>
+        <p:blipFill rotWithShape="1">
+          <a:blip r:embed="rId2"/>
+          <a:srcRect l="2901" t="48853" r="68501" b="10344"/>
+          <a:stretch/>
+        </p:blipFill>
+        <p:spPr>
+          <a:xfrm>
+            <a:off x="1746607" y="209538"/>
+            <a:ext cx="3598327" cy="3684368"/>
+          </a:xfrm>
+          <a:prstGeom prst="rect">
+            <a:avLst/>
+          </a:prstGeom>
+        </p:spPr>
+      </p:pic>
+      <p:pic>
+        <p:nvPicPr>
           <p:cNvPr id="34" name="Picture 33">
             <a:extLst>
               <a:ext uri="{FF2B5EF4-FFF2-40B4-BE49-F238E27FC236}">
@@ -2988,7 +3017,7 @@
           <p:nvPr/>
         </p:nvPicPr>
         <p:blipFill>
-          <a:blip r:embed="rId2"/>
+          <a:blip r:embed="rId3"/>
           <a:stretch>
             <a:fillRect/>
           </a:stretch>
@@ -3003,35 +3032,6 @@
           </a:prstGeom>
         </p:spPr>
       </p:pic>
-      <p:pic>
-        <p:nvPicPr>
-          <p:cNvPr id="35" name="Picture 34">
-            <a:extLst>
-              <a:ext uri="{FF2B5EF4-FFF2-40B4-BE49-F238E27FC236}">
-                <a16:creationId xmlns:a16="http://schemas.microsoft.com/office/drawing/2014/main" id="{E3E878F5-E89B-494C-BCBD-2F6202889905}"/>
-              </a:ext>
-            </a:extLst>
-          </p:cNvPr>
-          <p:cNvPicPr>
-            <a:picLocks noChangeAspect="1"/>
-          </p:cNvPicPr>
-          <p:nvPr/>
-        </p:nvPicPr>
-        <p:blipFill rotWithShape="1">
-          <a:blip r:embed="rId3"/>
-          <a:srcRect l="2689" t="47789" r="68099" b="9895"/>
-          <a:stretch/>
-        </p:blipFill>
-        <p:spPr>
-          <a:xfrm rot="5400000">
-            <a:off x="7053212" y="146557"/>
-            <a:ext cx="2981590" cy="3099445"/>
-          </a:xfrm>
-          <a:prstGeom prst="rect">
-            <a:avLst/>
-          </a:prstGeom>
-        </p:spPr>
-      </p:pic>
       <p:sp>
         <p:nvSpPr>
           <p:cNvPr id="36" name="Right Arrow 35">
@@ -3046,8 +3046,8 @@
         </p:nvSpPr>
         <p:spPr>
           <a:xfrm>
-            <a:off x="5394938" y="1334268"/>
-            <a:ext cx="1483698" cy="798618"/>
+            <a:off x="5530467" y="1654274"/>
+            <a:ext cx="1298166" cy="798618"/>
           </a:xfrm>
           <a:prstGeom prst="rightArrow">
             <a:avLst/>
@@ -3084,368 +3084,347 @@
           </a:p>
         </p:txBody>
       </p:sp>
-      <p:grpSp>
-        <p:nvGrpSpPr>
-          <p:cNvPr id="37" name="Group 36">
+      <p:sp>
+        <p:nvSpPr>
+          <p:cNvPr id="40" name="Oval 39">
             <a:extLst>
               <a:ext uri="{FF2B5EF4-FFF2-40B4-BE49-F238E27FC236}">
-                <a16:creationId xmlns:a16="http://schemas.microsoft.com/office/drawing/2014/main" id="{1B9E7EC1-C0DB-EB44-AE07-01DB60AB78F4}"/>
+                <a16:creationId xmlns:a16="http://schemas.microsoft.com/office/drawing/2014/main" id="{C5A8BA84-920F-3944-B135-6A1D6A68DC69}"/>
               </a:ext>
             </a:extLst>
           </p:cNvPr>
-          <p:cNvGrpSpPr/>
+          <p:cNvSpPr/>
           <p:nvPr/>
-        </p:nvGrpSpPr>
-        <p:grpSpPr>
+        </p:nvSpPr>
+        <p:spPr>
           <a:xfrm rot="5400000">
-            <a:off x="2495141" y="261877"/>
-            <a:ext cx="2989924" cy="2860470"/>
-            <a:chOff x="2824436" y="397048"/>
-            <a:chExt cx="2713693" cy="2684708"/>
+            <a:off x="1698831" y="1908152"/>
+            <a:ext cx="392560" cy="396192"/>
           </a:xfrm>
-        </p:grpSpPr>
-        <p:pic>
-          <p:nvPicPr>
-            <p:cNvPr id="38" name="Picture 37">
-              <a:extLst>
-                <a:ext uri="{FF2B5EF4-FFF2-40B4-BE49-F238E27FC236}">
-                  <a16:creationId xmlns:a16="http://schemas.microsoft.com/office/drawing/2014/main" id="{19AB7335-AD67-CA4C-9339-8212ED5ADA37}"/>
-                </a:ext>
-              </a:extLst>
-            </p:cNvPr>
-            <p:cNvPicPr>
-              <a:picLocks noChangeAspect="1"/>
-            </p:cNvPicPr>
-            <p:nvPr/>
-          </p:nvPicPr>
-          <p:blipFill rotWithShape="1">
-            <a:blip r:embed="rId4"/>
-            <a:srcRect l="2044" t="48759" r="68268" b="10514"/>
-            <a:stretch/>
-          </p:blipFill>
-          <p:spPr>
-            <a:xfrm>
-              <a:off x="2824436" y="410214"/>
-              <a:ext cx="2713693" cy="2671542"/>
-            </a:xfrm>
-            <a:prstGeom prst="rect">
-              <a:avLst/>
-            </a:prstGeom>
-          </p:spPr>
-        </p:pic>
-        <p:sp>
-          <p:nvSpPr>
-            <p:cNvPr id="39" name="Oval 38">
-              <a:extLst>
-                <a:ext uri="{FF2B5EF4-FFF2-40B4-BE49-F238E27FC236}">
-                  <a16:creationId xmlns:a16="http://schemas.microsoft.com/office/drawing/2014/main" id="{948067CD-4FF7-044F-A20F-FFE8B544C4C9}"/>
-                </a:ext>
-              </a:extLst>
-            </p:cNvPr>
-            <p:cNvSpPr/>
-            <p:nvPr/>
-          </p:nvSpPr>
-          <p:spPr>
-            <a:xfrm>
-              <a:off x="4331221" y="397048"/>
-              <a:ext cx="250506" cy="244844"/>
-            </a:xfrm>
-            <a:prstGeom prst="ellipse">
-              <a:avLst/>
-            </a:prstGeom>
-            <a:noFill/>
-            <a:ln>
-              <a:solidFill>
-                <a:srgbClr val="00B050"/>
-              </a:solidFill>
-            </a:ln>
-          </p:spPr>
-          <p:style>
-            <a:lnRef idx="2">
-              <a:schemeClr val="accent1">
-                <a:shade val="50000"/>
-              </a:schemeClr>
-            </a:lnRef>
-            <a:fillRef idx="1">
-              <a:schemeClr val="accent1"/>
-            </a:fillRef>
-            <a:effectRef idx="0">
-              <a:schemeClr val="accent1"/>
-            </a:effectRef>
-            <a:fontRef idx="minor">
-              <a:schemeClr val="lt1"/>
-            </a:fontRef>
-          </p:style>
-          <p:txBody>
-            <a:bodyPr rtlCol="0" anchor="ctr"/>
-            <a:lstStyle/>
-            <a:p>
-              <a:pPr algn="ctr"/>
-              <a:endParaRPr lang="en-US"/>
-            </a:p>
-          </p:txBody>
-        </p:sp>
-        <p:sp>
-          <p:nvSpPr>
-            <p:cNvPr id="40" name="Oval 39">
-              <a:extLst>
-                <a:ext uri="{FF2B5EF4-FFF2-40B4-BE49-F238E27FC236}">
-                  <a16:creationId xmlns:a16="http://schemas.microsoft.com/office/drawing/2014/main" id="{C5A8BA84-920F-3944-B135-6A1D6A68DC69}"/>
-                </a:ext>
-              </a:extLst>
-            </p:cNvPr>
-            <p:cNvSpPr/>
-            <p:nvPr/>
-          </p:nvSpPr>
-          <p:spPr>
-            <a:xfrm>
-              <a:off x="3959777" y="2797634"/>
-              <a:ext cx="250506" cy="244844"/>
-            </a:xfrm>
-            <a:prstGeom prst="ellipse">
-              <a:avLst/>
-            </a:prstGeom>
-            <a:noFill/>
-            <a:ln>
-              <a:solidFill>
-                <a:srgbClr val="00B050"/>
-              </a:solidFill>
-            </a:ln>
-          </p:spPr>
-          <p:style>
-            <a:lnRef idx="2">
-              <a:schemeClr val="accent1">
-                <a:shade val="50000"/>
-              </a:schemeClr>
-            </a:lnRef>
-            <a:fillRef idx="1">
-              <a:schemeClr val="accent1"/>
-            </a:fillRef>
-            <a:effectRef idx="0">
-              <a:schemeClr val="accent1"/>
-            </a:effectRef>
-            <a:fontRef idx="minor">
-              <a:schemeClr val="lt1"/>
-            </a:fontRef>
-          </p:style>
-          <p:txBody>
-            <a:bodyPr rtlCol="0" anchor="ctr"/>
-            <a:lstStyle/>
-            <a:p>
-              <a:pPr algn="ctr"/>
-              <a:endParaRPr lang="en-US"/>
-            </a:p>
-          </p:txBody>
-        </p:sp>
-        <mc:AlternateContent xmlns:mc="http://schemas.openxmlformats.org/markup-compatibility/2006">
-          <mc:Choice xmlns:a14="http://schemas.microsoft.com/office/drawing/2010/main" Requires="a14">
-            <p:sp>
-              <p:nvSpPr>
-                <p:cNvPr id="41" name="TextBox 40">
-                  <a:extLst>
-                    <a:ext uri="{FF2B5EF4-FFF2-40B4-BE49-F238E27FC236}">
-                      <a16:creationId xmlns:a16="http://schemas.microsoft.com/office/drawing/2014/main" id="{DADE6AA2-3F6E-9041-87A4-61711C5B1667}"/>
-                    </a:ext>
-                  </a:extLst>
-                </p:cNvPr>
-                <p:cNvSpPr txBox="1"/>
-                <p:nvPr/>
-              </p:nvSpPr>
-              <p:spPr>
-                <a:xfrm rot="16200000">
-                  <a:off x="4138104" y="772246"/>
-                  <a:ext cx="1006072" cy="369332"/>
-                </a:xfrm>
-                <a:prstGeom prst="rect">
-                  <a:avLst/>
-                </a:prstGeom>
-                <a:noFill/>
-              </p:spPr>
-              <p:txBody>
-                <a:bodyPr wrap="square" rtlCol="0">
-                  <a:spAutoFit/>
-                </a:bodyPr>
-                <a:lstStyle/>
-                <a:p>
-                  <a:pPr/>
-                  <a14:m>
-                    <m:oMathPara xmlns:m="http://schemas.openxmlformats.org/officeDocument/2006/math">
-                      <m:oMathParaPr>
-                        <m:jc m:val="centerGroup"/>
-                      </m:oMathParaPr>
-                      <m:oMath xmlns:m="http://schemas.openxmlformats.org/officeDocument/2006/math">
-                        <m:r>
-                          <a:rPr lang="en-US" i="1" smtClean="0">
-                            <a:latin typeface="Cambria Math" panose="02040503050406030204" pitchFamily="18" charset="0"/>
-                            <a:ea typeface="Cambria Math" panose="02040503050406030204" pitchFamily="18" charset="0"/>
-                          </a:rPr>
-                          <m:t>𝛿</m:t>
-                        </m:r>
-                        <m:r>
-                          <a:rPr lang="en-US" b="0" i="1" smtClean="0">
-                            <a:latin typeface="Cambria Math" panose="02040503050406030204" pitchFamily="18" charset="0"/>
-                            <a:ea typeface="Cambria Math" panose="02040503050406030204" pitchFamily="18" charset="0"/>
-                          </a:rPr>
-                          <m:t>=0.1</m:t>
-                        </m:r>
-                      </m:oMath>
-                    </m:oMathPara>
-                  </a14:m>
-                  <a:endParaRPr lang="en-US" dirty="0"/>
-                </a:p>
-              </p:txBody>
-            </p:sp>
-          </mc:Choice>
-          <mc:Fallback>
-            <p:sp>
-              <p:nvSpPr>
-                <p:cNvPr id="41" name="TextBox 40">
-                  <a:extLst>
-                    <a:ext uri="{FF2B5EF4-FFF2-40B4-BE49-F238E27FC236}">
-                      <a16:creationId xmlns:a16="http://schemas.microsoft.com/office/drawing/2014/main" id="{DADE6AA2-3F6E-9041-87A4-61711C5B1667}"/>
-                    </a:ext>
-                  </a:extLst>
-                </p:cNvPr>
-                <p:cNvSpPr txBox="1">
-                  <a:spLocks noRot="1" noChangeAspect="1" noMove="1" noResize="1" noEditPoints="1" noAdjustHandles="1" noChangeArrowheads="1" noChangeShapeType="1" noTextEdit="1"/>
-                </p:cNvSpPr>
-                <p:nvPr/>
-              </p:nvSpPr>
-              <p:spPr>
-                <a:xfrm rot="16200000">
-                  <a:off x="4138104" y="772246"/>
-                  <a:ext cx="1006072" cy="369332"/>
-                </a:xfrm>
-                <a:prstGeom prst="rect">
-                  <a:avLst/>
-                </a:prstGeom>
-                <a:blipFill>
-                  <a:blip r:embed="rId5"/>
-                  <a:stretch>
-                    <a:fillRect/>
-                  </a:stretch>
-                </a:blipFill>
-              </p:spPr>
-              <p:txBody>
-                <a:bodyPr/>
-                <a:lstStyle/>
-                <a:p>
-                  <a:r>
-                    <a:rPr lang="en-US">
-                      <a:noFill/>
-                    </a:rPr>
-                    <a:t> </a:t>
-                  </a:r>
-                </a:p>
-              </p:txBody>
-            </p:sp>
-          </mc:Fallback>
-        </mc:AlternateContent>
-        <mc:AlternateContent xmlns:mc="http://schemas.openxmlformats.org/markup-compatibility/2006">
-          <mc:Choice xmlns:a14="http://schemas.microsoft.com/office/drawing/2010/main" Requires="a14">
-            <p:sp>
-              <p:nvSpPr>
-                <p:cNvPr id="42" name="TextBox 41">
-                  <a:extLst>
-                    <a:ext uri="{FF2B5EF4-FFF2-40B4-BE49-F238E27FC236}">
-                      <a16:creationId xmlns:a16="http://schemas.microsoft.com/office/drawing/2014/main" id="{A23D8AA9-6060-864A-8D43-6F5747D0F69A}"/>
-                    </a:ext>
-                  </a:extLst>
-                </p:cNvPr>
-                <p:cNvSpPr txBox="1"/>
-                <p:nvPr/>
-              </p:nvSpPr>
-              <p:spPr>
-                <a:xfrm rot="16200000">
-                  <a:off x="3377157" y="2302300"/>
-                  <a:ext cx="1006072" cy="369332"/>
-                </a:xfrm>
-                <a:prstGeom prst="rect">
-                  <a:avLst/>
-                </a:prstGeom>
-                <a:noFill/>
-              </p:spPr>
-              <p:txBody>
-                <a:bodyPr wrap="square" rtlCol="0">
-                  <a:spAutoFit/>
-                </a:bodyPr>
-                <a:lstStyle/>
-                <a:p>
-                  <a:pPr/>
-                  <a14:m>
-                    <m:oMathPara xmlns:m="http://schemas.openxmlformats.org/officeDocument/2006/math">
-                      <m:oMathParaPr>
-                        <m:jc m:val="centerGroup"/>
-                      </m:oMathParaPr>
-                      <m:oMath xmlns:m="http://schemas.openxmlformats.org/officeDocument/2006/math">
-                        <m:r>
-                          <a:rPr lang="en-US" i="1" smtClean="0">
-                            <a:latin typeface="Cambria Math" panose="02040503050406030204" pitchFamily="18" charset="0"/>
-                            <a:ea typeface="Cambria Math" panose="02040503050406030204" pitchFamily="18" charset="0"/>
-                          </a:rPr>
-                          <m:t>𝛿</m:t>
-                        </m:r>
-                        <m:r>
-                          <a:rPr lang="en-US" b="0" i="1" smtClean="0">
-                            <a:latin typeface="Cambria Math" panose="02040503050406030204" pitchFamily="18" charset="0"/>
-                            <a:ea typeface="Cambria Math" panose="02040503050406030204" pitchFamily="18" charset="0"/>
-                          </a:rPr>
-                          <m:t>=0.1</m:t>
-                        </m:r>
-                      </m:oMath>
-                    </m:oMathPara>
-                  </a14:m>
-                  <a:endParaRPr lang="en-US" dirty="0"/>
-                </a:p>
-              </p:txBody>
-            </p:sp>
-          </mc:Choice>
-          <mc:Fallback>
-            <p:sp>
-              <p:nvSpPr>
-                <p:cNvPr id="42" name="TextBox 41">
-                  <a:extLst>
-                    <a:ext uri="{FF2B5EF4-FFF2-40B4-BE49-F238E27FC236}">
-                      <a16:creationId xmlns:a16="http://schemas.microsoft.com/office/drawing/2014/main" id="{A23D8AA9-6060-864A-8D43-6F5747D0F69A}"/>
-                    </a:ext>
-                  </a:extLst>
-                </p:cNvPr>
-                <p:cNvSpPr txBox="1">
-                  <a:spLocks noRot="1" noChangeAspect="1" noMove="1" noResize="1" noEditPoints="1" noAdjustHandles="1" noChangeArrowheads="1" noChangeShapeType="1" noTextEdit="1"/>
-                </p:cNvSpPr>
-                <p:nvPr/>
-              </p:nvSpPr>
-              <p:spPr>
-                <a:xfrm rot="16200000">
-                  <a:off x="3377157" y="2302300"/>
-                  <a:ext cx="1006072" cy="369332"/>
-                </a:xfrm>
-                <a:prstGeom prst="rect">
-                  <a:avLst/>
-                </a:prstGeom>
-                <a:blipFill>
-                  <a:blip r:embed="rId6"/>
-                  <a:stretch>
-                    <a:fillRect/>
-                  </a:stretch>
-                </a:blipFill>
-              </p:spPr>
-              <p:txBody>
-                <a:bodyPr/>
-                <a:lstStyle/>
-                <a:p>
-                  <a:r>
-                    <a:rPr lang="en-US">
-                      <a:noFill/>
-                    </a:rPr>
-                    <a:t> </a:t>
-                  </a:r>
-                </a:p>
-              </p:txBody>
-            </p:sp>
-          </mc:Fallback>
-        </mc:AlternateContent>
-      </p:grpSp>
+          <a:prstGeom prst="ellipse">
+            <a:avLst/>
+          </a:prstGeom>
+          <a:noFill/>
+          <a:ln>
+            <a:solidFill>
+              <a:srgbClr val="00B050"/>
+            </a:solidFill>
+          </a:ln>
+        </p:spPr>
+        <p:style>
+          <a:lnRef idx="2">
+            <a:schemeClr val="accent1">
+              <a:shade val="50000"/>
+            </a:schemeClr>
+          </a:lnRef>
+          <a:fillRef idx="1">
+            <a:schemeClr val="accent1"/>
+          </a:fillRef>
+          <a:effectRef idx="0">
+            <a:schemeClr val="accent1"/>
+          </a:effectRef>
+          <a:fontRef idx="minor">
+            <a:schemeClr val="lt1"/>
+          </a:fontRef>
+        </p:style>
+        <p:txBody>
+          <a:bodyPr rtlCol="0" anchor="ctr"/>
+          <a:lstStyle/>
+          <a:p>
+            <a:pPr algn="ctr"/>
+            <a:endParaRPr lang="en-US"/>
+          </a:p>
+        </p:txBody>
+      </p:sp>
+      <mc:AlternateContent xmlns:mc="http://schemas.openxmlformats.org/markup-compatibility/2006">
+        <mc:Choice xmlns:a14="http://schemas.microsoft.com/office/drawing/2010/main" Requires="a14">
+          <p:sp>
+            <p:nvSpPr>
+              <p:cNvPr id="41" name="TextBox 40">
+                <a:extLst>
+                  <a:ext uri="{FF2B5EF4-FFF2-40B4-BE49-F238E27FC236}">
+                    <a16:creationId xmlns:a16="http://schemas.microsoft.com/office/drawing/2014/main" id="{DADE6AA2-3F6E-9041-87A4-61711C5B1667}"/>
+                  </a:ext>
+                </a:extLst>
+              </p:cNvPr>
+              <p:cNvSpPr txBox="1"/>
+              <p:nvPr/>
+            </p:nvSpPr>
+            <p:spPr>
+              <a:xfrm>
+                <a:off x="4230085" y="2039705"/>
+                <a:ext cx="1071938" cy="406927"/>
+              </a:xfrm>
+              <a:prstGeom prst="rect">
+                <a:avLst/>
+              </a:prstGeom>
+              <a:noFill/>
+            </p:spPr>
+            <p:txBody>
+              <a:bodyPr wrap="square" rtlCol="0">
+                <a:spAutoFit/>
+              </a:bodyPr>
+              <a:lstStyle/>
+              <a:p>
+                <a:pPr/>
+                <a14:m>
+                  <m:oMathPara xmlns:m="http://schemas.openxmlformats.org/officeDocument/2006/math">
+                    <m:oMathParaPr>
+                      <m:jc m:val="centerGroup"/>
+                    </m:oMathParaPr>
+                    <m:oMath xmlns:m="http://schemas.openxmlformats.org/officeDocument/2006/math">
+                      <m:r>
+                        <a:rPr lang="en-US" i="1" smtClean="0">
+                          <a:latin typeface="Cambria Math" panose="02040503050406030204" pitchFamily="18" charset="0"/>
+                          <a:ea typeface="Cambria Math" panose="02040503050406030204" pitchFamily="18" charset="0"/>
+                        </a:rPr>
+                        <m:t>𝛿</m:t>
+                      </m:r>
+                      <m:r>
+                        <a:rPr lang="en-US" b="0" i="1" smtClean="0">
+                          <a:latin typeface="Cambria Math" panose="02040503050406030204" pitchFamily="18" charset="0"/>
+                          <a:ea typeface="Cambria Math" panose="02040503050406030204" pitchFamily="18" charset="0"/>
+                        </a:rPr>
+                        <m:t>=0.1</m:t>
+                      </m:r>
+                    </m:oMath>
+                  </m:oMathPara>
+                </a14:m>
+                <a:endParaRPr lang="en-US" dirty="0"/>
+              </a:p>
+            </p:txBody>
+          </p:sp>
+        </mc:Choice>
+        <mc:Fallback>
+          <p:sp>
+            <p:nvSpPr>
+              <p:cNvPr id="41" name="TextBox 40">
+                <a:extLst>
+                  <a:ext uri="{FF2B5EF4-FFF2-40B4-BE49-F238E27FC236}">
+                    <a16:creationId xmlns:a16="http://schemas.microsoft.com/office/drawing/2014/main" id="{DADE6AA2-3F6E-9041-87A4-61711C5B1667}"/>
+                  </a:ext>
+                </a:extLst>
+              </p:cNvPr>
+              <p:cNvSpPr txBox="1">
+                <a:spLocks noRot="1" noChangeAspect="1" noMove="1" noResize="1" noEditPoints="1" noAdjustHandles="1" noChangeArrowheads="1" noChangeShapeType="1" noTextEdit="1"/>
+              </p:cNvSpPr>
+              <p:nvPr/>
+            </p:nvSpPr>
+            <p:spPr>
+              <a:xfrm>
+                <a:off x="4230085" y="2039705"/>
+                <a:ext cx="1071938" cy="406927"/>
+              </a:xfrm>
+              <a:prstGeom prst="rect">
+                <a:avLst/>
+              </a:prstGeom>
+              <a:blipFill>
+                <a:blip r:embed="rId4"/>
+                <a:stretch>
+                  <a:fillRect/>
+                </a:stretch>
+              </a:blipFill>
+            </p:spPr>
+            <p:txBody>
+              <a:bodyPr/>
+              <a:lstStyle/>
+              <a:p>
+                <a:r>
+                  <a:rPr lang="en-US">
+                    <a:noFill/>
+                  </a:rPr>
+                  <a:t> </a:t>
+                </a:r>
+              </a:p>
+            </p:txBody>
+          </p:sp>
+        </mc:Fallback>
+      </mc:AlternateContent>
+      <mc:AlternateContent xmlns:mc="http://schemas.openxmlformats.org/markup-compatibility/2006">
+        <mc:Choice xmlns:a14="http://schemas.microsoft.com/office/drawing/2010/main" Requires="a14">
+          <p:sp>
+            <p:nvSpPr>
+              <p:cNvPr id="42" name="TextBox 41">
+                <a:extLst>
+                  <a:ext uri="{FF2B5EF4-FFF2-40B4-BE49-F238E27FC236}">
+                    <a16:creationId xmlns:a16="http://schemas.microsoft.com/office/drawing/2014/main" id="{A23D8AA9-6060-864A-8D43-6F5747D0F69A}"/>
+                  </a:ext>
+                </a:extLst>
+              </p:cNvPr>
+              <p:cNvSpPr txBox="1"/>
+              <p:nvPr/>
+            </p:nvSpPr>
+            <p:spPr>
+              <a:xfrm>
+                <a:off x="1819029" y="1673903"/>
+                <a:ext cx="1071938" cy="406927"/>
+              </a:xfrm>
+              <a:prstGeom prst="rect">
+                <a:avLst/>
+              </a:prstGeom>
+              <a:noFill/>
+            </p:spPr>
+            <p:txBody>
+              <a:bodyPr wrap="square" rtlCol="0">
+                <a:spAutoFit/>
+              </a:bodyPr>
+              <a:lstStyle/>
+              <a:p>
+                <a:pPr/>
+                <a14:m>
+                  <m:oMathPara xmlns:m="http://schemas.openxmlformats.org/officeDocument/2006/math">
+                    <m:oMathParaPr>
+                      <m:jc m:val="centerGroup"/>
+                    </m:oMathParaPr>
+                    <m:oMath xmlns:m="http://schemas.openxmlformats.org/officeDocument/2006/math">
+                      <m:r>
+                        <a:rPr lang="en-US" i="1" smtClean="0">
+                          <a:latin typeface="Cambria Math" panose="02040503050406030204" pitchFamily="18" charset="0"/>
+                          <a:ea typeface="Cambria Math" panose="02040503050406030204" pitchFamily="18" charset="0"/>
+                        </a:rPr>
+                        <m:t>𝛿</m:t>
+                      </m:r>
+                      <m:r>
+                        <a:rPr lang="en-US" b="0" i="1" smtClean="0">
+                          <a:latin typeface="Cambria Math" panose="02040503050406030204" pitchFamily="18" charset="0"/>
+                          <a:ea typeface="Cambria Math" panose="02040503050406030204" pitchFamily="18" charset="0"/>
+                        </a:rPr>
+                        <m:t>=0.1</m:t>
+                      </m:r>
+                    </m:oMath>
+                  </m:oMathPara>
+                </a14:m>
+                <a:endParaRPr lang="en-US" dirty="0"/>
+              </a:p>
+            </p:txBody>
+          </p:sp>
+        </mc:Choice>
+        <mc:Fallback>
+          <p:sp>
+            <p:nvSpPr>
+              <p:cNvPr id="42" name="TextBox 41">
+                <a:extLst>
+                  <a:ext uri="{FF2B5EF4-FFF2-40B4-BE49-F238E27FC236}">
+                    <a16:creationId xmlns:a16="http://schemas.microsoft.com/office/drawing/2014/main" id="{A23D8AA9-6060-864A-8D43-6F5747D0F69A}"/>
+                  </a:ext>
+                </a:extLst>
+              </p:cNvPr>
+              <p:cNvSpPr txBox="1">
+                <a:spLocks noRot="1" noChangeAspect="1" noMove="1" noResize="1" noEditPoints="1" noAdjustHandles="1" noChangeArrowheads="1" noChangeShapeType="1" noTextEdit="1"/>
+              </p:cNvSpPr>
+              <p:nvPr/>
+            </p:nvSpPr>
+            <p:spPr>
+              <a:xfrm>
+                <a:off x="1819029" y="1673903"/>
+                <a:ext cx="1071938" cy="406927"/>
+              </a:xfrm>
+              <a:prstGeom prst="rect">
+                <a:avLst/>
+              </a:prstGeom>
+              <a:blipFill>
+                <a:blip r:embed="rId5"/>
+                <a:stretch>
+                  <a:fillRect/>
+                </a:stretch>
+              </a:blipFill>
+            </p:spPr>
+            <p:txBody>
+              <a:bodyPr/>
+              <a:lstStyle/>
+              <a:p>
+                <a:r>
+                  <a:rPr lang="en-US">
+                    <a:noFill/>
+                  </a:rPr>
+                  <a:t> </a:t>
+                </a:r>
+              </a:p>
+            </p:txBody>
+          </p:sp>
+        </mc:Fallback>
+      </mc:AlternateContent>
+      <p:pic>
+        <p:nvPicPr>
+          <p:cNvPr id="5" name="Picture 4">
+            <a:extLst>
+              <a:ext uri="{FF2B5EF4-FFF2-40B4-BE49-F238E27FC236}">
+                <a16:creationId xmlns:a16="http://schemas.microsoft.com/office/drawing/2014/main" id="{EF4C0675-44CD-5D4A-9CB2-37F7A3F8E249}"/>
+              </a:ext>
+            </a:extLst>
+          </p:cNvPr>
+          <p:cNvPicPr>
+            <a:picLocks noChangeAspect="1"/>
+          </p:cNvPicPr>
+          <p:nvPr/>
+        </p:nvPicPr>
+        <p:blipFill rotWithShape="1">
+          <a:blip r:embed="rId6"/>
+          <a:srcRect l="3019" t="48484" r="68384" b="10712"/>
+          <a:stretch/>
+        </p:blipFill>
+        <p:spPr>
+          <a:xfrm>
+            <a:off x="6871325" y="98536"/>
+            <a:ext cx="3526121" cy="3610435"/>
+          </a:xfrm>
+          <a:prstGeom prst="rect">
+            <a:avLst/>
+          </a:prstGeom>
+        </p:spPr>
+      </p:pic>
+      <p:sp>
+        <p:nvSpPr>
+          <p:cNvPr id="15" name="Oval 14">
+            <a:extLst>
+              <a:ext uri="{FF2B5EF4-FFF2-40B4-BE49-F238E27FC236}">
+                <a16:creationId xmlns:a16="http://schemas.microsoft.com/office/drawing/2014/main" id="{C03FD175-894D-714F-972E-31C61694FA73}"/>
+              </a:ext>
+            </a:extLst>
+          </p:cNvPr>
+          <p:cNvSpPr/>
+          <p:nvPr/>
+        </p:nvSpPr>
+        <p:spPr>
+          <a:xfrm rot="5400000">
+            <a:off x="5040627" y="1830240"/>
+            <a:ext cx="392560" cy="396192"/>
+          </a:xfrm>
+          <a:prstGeom prst="ellipse">
+            <a:avLst/>
+          </a:prstGeom>
+          <a:noFill/>
+          <a:ln>
+            <a:solidFill>
+              <a:srgbClr val="00B050"/>
+            </a:solidFill>
+          </a:ln>
+        </p:spPr>
+        <p:style>
+          <a:lnRef idx="2">
+            <a:schemeClr val="accent1">
+              <a:shade val="50000"/>
+            </a:schemeClr>
+          </a:lnRef>
+          <a:fillRef idx="1">
+            <a:schemeClr val="accent1"/>
+          </a:fillRef>
+          <a:effectRef idx="0">
+            <a:schemeClr val="accent1"/>
+          </a:effectRef>
+          <a:fontRef idx="minor">
+            <a:schemeClr val="lt1"/>
+          </a:fontRef>
+        </p:style>
+        <p:txBody>
+          <a:bodyPr rtlCol="0" anchor="ctr"/>
+          <a:lstStyle/>
+          <a:p>
+            <a:pPr algn="ctr"/>
+            <a:endParaRPr lang="en-US"/>
+          </a:p>
+        </p:txBody>
+      </p:sp>
     </p:spTree>
     <p:extLst>
       <p:ext uri="{BB962C8B-B14F-4D97-AF65-F5344CB8AC3E}">

</xml_diff>